<commit_message>
Update Cyber Crime in India(2016-2018) Dashboard.pptx
</commit_message>
<xml_diff>
--- a/Cyber Crime in India(2016-2018) Dashboard.pptx
+++ b/Cyber Crime in India(2016-2018) Dashboard.pptx
@@ -265,7 +265,7 @@
           <a:p>
             <a:fld id="{522C7825-92DD-4B13-ACC4-21D29AA9AE67}" type="datetimeFigureOut">
               <a:rPr lang="en-IN" smtClean="0"/>
-              <a:t>31-08-2025</a:t>
+              <a:t>12-09-2025</a:t>
             </a:fld>
             <a:endParaRPr lang="en-IN"/>
           </a:p>
@@ -465,7 +465,7 @@
           <a:p>
             <a:fld id="{522C7825-92DD-4B13-ACC4-21D29AA9AE67}" type="datetimeFigureOut">
               <a:rPr lang="en-IN" smtClean="0"/>
-              <a:t>31-08-2025</a:t>
+              <a:t>12-09-2025</a:t>
             </a:fld>
             <a:endParaRPr lang="en-IN"/>
           </a:p>
@@ -675,7 +675,7 @@
           <a:p>
             <a:fld id="{522C7825-92DD-4B13-ACC4-21D29AA9AE67}" type="datetimeFigureOut">
               <a:rPr lang="en-IN" smtClean="0"/>
-              <a:t>31-08-2025</a:t>
+              <a:t>12-09-2025</a:t>
             </a:fld>
             <a:endParaRPr lang="en-IN"/>
           </a:p>
@@ -875,7 +875,7 @@
           <a:p>
             <a:fld id="{522C7825-92DD-4B13-ACC4-21D29AA9AE67}" type="datetimeFigureOut">
               <a:rPr lang="en-IN" smtClean="0"/>
-              <a:t>31-08-2025</a:t>
+              <a:t>12-09-2025</a:t>
             </a:fld>
             <a:endParaRPr lang="en-IN"/>
           </a:p>
@@ -1151,7 +1151,7 @@
           <a:p>
             <a:fld id="{522C7825-92DD-4B13-ACC4-21D29AA9AE67}" type="datetimeFigureOut">
               <a:rPr lang="en-IN" smtClean="0"/>
-              <a:t>31-08-2025</a:t>
+              <a:t>12-09-2025</a:t>
             </a:fld>
             <a:endParaRPr lang="en-IN"/>
           </a:p>
@@ -1419,7 +1419,7 @@
           <a:p>
             <a:fld id="{522C7825-92DD-4B13-ACC4-21D29AA9AE67}" type="datetimeFigureOut">
               <a:rPr lang="en-IN" smtClean="0"/>
-              <a:t>31-08-2025</a:t>
+              <a:t>12-09-2025</a:t>
             </a:fld>
             <a:endParaRPr lang="en-IN"/>
           </a:p>
@@ -1834,7 +1834,7 @@
           <a:p>
             <a:fld id="{522C7825-92DD-4B13-ACC4-21D29AA9AE67}" type="datetimeFigureOut">
               <a:rPr lang="en-IN" smtClean="0"/>
-              <a:t>31-08-2025</a:t>
+              <a:t>12-09-2025</a:t>
             </a:fld>
             <a:endParaRPr lang="en-IN"/>
           </a:p>
@@ -1976,7 +1976,7 @@
           <a:p>
             <a:fld id="{522C7825-92DD-4B13-ACC4-21D29AA9AE67}" type="datetimeFigureOut">
               <a:rPr lang="en-IN" smtClean="0"/>
-              <a:t>31-08-2025</a:t>
+              <a:t>12-09-2025</a:t>
             </a:fld>
             <a:endParaRPr lang="en-IN"/>
           </a:p>
@@ -2089,7 +2089,7 @@
           <a:p>
             <a:fld id="{522C7825-92DD-4B13-ACC4-21D29AA9AE67}" type="datetimeFigureOut">
               <a:rPr lang="en-IN" smtClean="0"/>
-              <a:t>31-08-2025</a:t>
+              <a:t>12-09-2025</a:t>
             </a:fld>
             <a:endParaRPr lang="en-IN"/>
           </a:p>
@@ -2402,7 +2402,7 @@
           <a:p>
             <a:fld id="{522C7825-92DD-4B13-ACC4-21D29AA9AE67}" type="datetimeFigureOut">
               <a:rPr lang="en-IN" smtClean="0"/>
-              <a:t>31-08-2025</a:t>
+              <a:t>12-09-2025</a:t>
             </a:fld>
             <a:endParaRPr lang="en-IN"/>
           </a:p>
@@ -2691,7 +2691,7 @@
           <a:p>
             <a:fld id="{522C7825-92DD-4B13-ACC4-21D29AA9AE67}" type="datetimeFigureOut">
               <a:rPr lang="en-IN" smtClean="0"/>
-              <a:t>31-08-2025</a:t>
+              <a:t>12-09-2025</a:t>
             </a:fld>
             <a:endParaRPr lang="en-IN"/>
           </a:p>
@@ -2934,7 +2934,7 @@
           <a:p>
             <a:fld id="{522C7825-92DD-4B13-ACC4-21D29AA9AE67}" type="datetimeFigureOut">
               <a:rPr lang="en-IN" smtClean="0"/>
-              <a:t>31-08-2025</a:t>
+              <a:t>12-09-2025</a:t>
             </a:fld>
             <a:endParaRPr lang="en-IN"/>
           </a:p>
@@ -3801,10 +3801,10 @@
       </p:cxnSp>
       <p:pic>
         <p:nvPicPr>
-          <p:cNvPr id="4" name="Picture 3">
-            <a:extLst>
-              <a:ext uri="{FF2B5EF4-FFF2-40B4-BE49-F238E27FC236}">
-                <a16:creationId xmlns:a16="http://schemas.microsoft.com/office/drawing/2014/main" id="{7CB09326-4073-85D0-D088-0D26F01E2055}"/>
+          <p:cNvPr id="3" name="Picture 2">
+            <a:extLst>
+              <a:ext uri="{FF2B5EF4-FFF2-40B4-BE49-F238E27FC236}">
+                <a16:creationId xmlns:a16="http://schemas.microsoft.com/office/drawing/2014/main" id="{C2D71002-2DC3-FA98-3718-196DC52B706C}"/>
               </a:ext>
             </a:extLst>
           </p:cNvPr>
@@ -3821,8 +3821,8 @@
         </p:blipFill>
         <p:spPr>
           <a:xfrm>
-            <a:off x="8319556" y="1008834"/>
-            <a:ext cx="3362794" cy="5519982"/>
+            <a:off x="237744" y="1098624"/>
+            <a:ext cx="7621762" cy="4196383"/>
           </a:xfrm>
           <a:prstGeom prst="rect">
             <a:avLst/>
@@ -3831,10 +3831,10 @@
       </p:pic>
       <p:pic>
         <p:nvPicPr>
-          <p:cNvPr id="9" name="Picture 8">
-            <a:extLst>
-              <a:ext uri="{FF2B5EF4-FFF2-40B4-BE49-F238E27FC236}">
-                <a16:creationId xmlns:a16="http://schemas.microsoft.com/office/drawing/2014/main" id="{02459B51-075D-85E4-E6B7-59F4CAE63B38}"/>
+          <p:cNvPr id="6" name="Picture 5">
+            <a:extLst>
+              <a:ext uri="{FF2B5EF4-FFF2-40B4-BE49-F238E27FC236}">
+                <a16:creationId xmlns:a16="http://schemas.microsoft.com/office/drawing/2014/main" id="{DADAE639-6E14-6210-C1FC-B262BBBA12AD}"/>
               </a:ext>
             </a:extLst>
           </p:cNvPr>
@@ -3851,8 +3851,8 @@
         </p:blipFill>
         <p:spPr>
           <a:xfrm>
-            <a:off x="261752" y="1107769"/>
-            <a:ext cx="7490542" cy="4195751"/>
+            <a:off x="8319559" y="1016328"/>
+            <a:ext cx="3314233" cy="5430192"/>
           </a:xfrm>
           <a:prstGeom prst="rect">
             <a:avLst/>

</xml_diff>